<commit_message>
ispravio sitne greske u prezentacijama
</commit_message>
<xml_diff>
--- a/predavanja/prezentacije/IP01-02-Uvod u Internet.pptx
+++ b/predavanja/prezentacije/IP01-02-Uvod u Internet.pptx
@@ -307,7 +307,7 @@
           <a:p>
             <a:fld id="{F07B70C6-757F-4600-A347-5E68BBCA3609}" type="datetimeFigureOut">
               <a:rPr lang="en-US" smtClean="0"/>
-              <a:t>10/22/2018</a:t>
+              <a:t>10/23/2018</a:t>
             </a:fld>
             <a:endParaRPr lang="en-US"/>
           </a:p>
@@ -472,7 +472,7 @@
           <a:p>
             <a:fld id="{6B3683FA-0560-4266-A2CA-8A7D404C35FD}" type="datetimeFigureOut">
               <a:rPr lang="en-US" smtClean="0"/>
-              <a:t>10/22/2018</a:t>
+              <a:t>10/23/2018</a:t>
             </a:fld>
             <a:endParaRPr lang="en-US"/>
           </a:p>
@@ -10062,7 +10062,23 @@
             </a:r>
             <a:r>
               <a:rPr lang="pl-PL" altLang="en-US" dirty="0" smtClean="0"/>
-              <a:t>postdiplomaca sa funiverziteta koji su imali ugovor sa Ministarstvom odbrane USA</a:t>
+              <a:t>postdiplomaca </a:t>
+            </a:r>
+            <a:r>
+              <a:rPr lang="pl-PL" altLang="en-US" dirty="0" err="1" smtClean="0"/>
+              <a:t>sa</a:t>
+            </a:r>
+            <a:r>
+              <a:rPr lang="pl-PL" altLang="en-US" dirty="0" smtClean="0"/>
+              <a:t> </a:t>
+            </a:r>
+            <a:r>
+              <a:rPr lang="pl-PL" altLang="en-US" dirty="0" err="1" smtClean="0"/>
+              <a:t>univerziteta</a:t>
+            </a:r>
+            <a:r>
+              <a:rPr lang="pl-PL" altLang="en-US" dirty="0" smtClean="0"/>
+              <a:t> koji su imali ugovor sa Ministarstvom odbrane USA</a:t>
             </a:r>
             <a:endParaRPr lang="pl-PL" altLang="en-US" dirty="0"/>
           </a:p>
@@ -14449,11 +14465,19 @@
             </a:r>
             <a:r>
               <a:rPr lang="sr-Latn-RS" altLang="en-US" dirty="0" smtClean="0"/>
-              <a:t>irine </a:t>
-            </a:r>
-            <a:r>
-              <a:rPr lang="sr-Latn-RS" altLang="en-US" dirty="0"/>
-              <a:t>4Khz i svaki pojas se nezavisno koristi za </a:t>
+              <a:t>irine 4K</a:t>
+            </a:r>
+            <a:r>
+              <a:rPr lang="en-US" altLang="en-US" dirty="0" smtClean="0"/>
+              <a:t>H</a:t>
+            </a:r>
+            <a:r>
+              <a:rPr lang="sr-Latn-RS" altLang="en-US" dirty="0" smtClean="0"/>
+              <a:t>z </a:t>
+            </a:r>
+            <a:r>
+              <a:rPr lang="sr-Latn-RS" altLang="en-US" dirty="0"/>
+              <a:t>i svaki pojas se nezavisno koristi za </a:t>
             </a:r>
             <a:r>
               <a:rPr lang="sr-Latn-RS" altLang="en-US" dirty="0" smtClean="0"/>
@@ -32289,7 +32313,7 @@
             </a:r>
             <a:r>
               <a:rPr lang="en-US" altLang="en-US" dirty="0" err="1" smtClean="0"/>
-              <a:t>izmed</a:t>
+              <a:t>izme</a:t>
             </a:r>
             <a:r>
               <a:rPr lang="sr-Latn-RS" altLang="en-US" dirty="0" smtClean="0"/>

</xml_diff>